<commit_message>
Add a public method to the component.
</commit_message>
<xml_diff>
--- a/2021-02-21 DotnetKonf/Presentation.pptx
+++ b/2021-02-21 DotnetKonf/Presentation.pptx
@@ -14,6 +14,8 @@
     <p:sldId id="320" r:id="rId8"/>
     <p:sldId id="321" r:id="rId9"/>
     <p:sldId id="319" r:id="rId10"/>
+    <p:sldId id="322" r:id="rId11"/>
+    <p:sldId id="323" r:id="rId12"/>
   </p:sldIdLst>
   <p:sldSz cx="12192000" cy="6858000"/>
   <p:notesSz cx="6858000" cy="9144000"/>
@@ -3459,6 +3461,346 @@
   <p:clrMapOvr>
     <a:masterClrMapping/>
   </p:clrMapOvr>
+</p:sld>
+</file>
+
+<file path=ppt/slides/slide10.xml><?xml version="1.0" encoding="utf-8"?>
+<p:sld xmlns:a="http://schemas.openxmlformats.org/drawingml/2006/main" xmlns:r="http://schemas.openxmlformats.org/officeDocument/2006/relationships" xmlns:p="http://schemas.openxmlformats.org/presentationml/2006/main">
+  <p:cSld>
+    <p:spTree>
+      <p:nvGrpSpPr>
+        <p:cNvPr id="1" name=""/>
+        <p:cNvGrpSpPr/>
+        <p:nvPr/>
+      </p:nvGrpSpPr>
+      <p:grpSpPr>
+        <a:xfrm>
+          <a:off x="0" y="0"/>
+          <a:ext cx="0" cy="0"/>
+          <a:chOff x="0" y="0"/>
+          <a:chExt cx="0" cy="0"/>
+        </a:xfrm>
+      </p:grpSpPr>
+      <p:sp>
+        <p:nvSpPr>
+          <p:cNvPr id="2" name="Title 1">
+            <a:extLst>
+              <a:ext uri="{FF2B5EF4-FFF2-40B4-BE49-F238E27FC236}">
+                <a16:creationId xmlns:a16="http://schemas.microsoft.com/office/drawing/2014/main" id="{7EB95001-8889-4017-B9F8-3489DCB9B4D9}"/>
+              </a:ext>
+            </a:extLst>
+          </p:cNvPr>
+          <p:cNvSpPr>
+            <a:spLocks noGrp="1"/>
+          </p:cNvSpPr>
+          <p:nvPr>
+            <p:ph type="title"/>
+          </p:nvPr>
+        </p:nvSpPr>
+        <p:spPr/>
+        <p:txBody>
+          <a:bodyPr/>
+          <a:lstStyle/>
+          <a:p>
+            <a:r>
+              <a:rPr lang="en-US" dirty="0"/>
+              <a:t>Route Parameters</a:t>
+            </a:r>
+          </a:p>
+        </p:txBody>
+      </p:sp>
+      <p:pic>
+        <p:nvPicPr>
+          <p:cNvPr id="5" name="Content Placeholder 4">
+            <a:extLst>
+              <a:ext uri="{FF2B5EF4-FFF2-40B4-BE49-F238E27FC236}">
+                <a16:creationId xmlns:a16="http://schemas.microsoft.com/office/drawing/2014/main" id="{945275E6-00F6-4FD2-9E76-3369BF3472B9}"/>
+              </a:ext>
+            </a:extLst>
+          </p:cNvPr>
+          <p:cNvPicPr>
+            <a:picLocks noGrp="1" noChangeAspect="1"/>
+          </p:cNvPicPr>
+          <p:nvPr>
+            <p:ph idx="1"/>
+          </p:nvPr>
+        </p:nvPicPr>
+        <p:blipFill>
+          <a:blip r:embed="rId2"/>
+          <a:stretch>
+            <a:fillRect/>
+          </a:stretch>
+        </p:blipFill>
+        <p:spPr>
+          <a:xfrm>
+            <a:off x="2481262" y="1834356"/>
+            <a:ext cx="7229475" cy="4333875"/>
+          </a:xfrm>
+        </p:spPr>
+      </p:pic>
+    </p:spTree>
+    <p:extLst>
+      <p:ext uri="{BB962C8B-B14F-4D97-AF65-F5344CB8AC3E}">
+        <p14:creationId xmlns:p14="http://schemas.microsoft.com/office/powerpoint/2010/main" val="649506597"/>
+      </p:ext>
+    </p:extLst>
+  </p:cSld>
+  <p:clrMapOvr>
+    <a:masterClrMapping/>
+  </p:clrMapOvr>
+</p:sld>
+</file>
+
+<file path=ppt/slides/slide11.xml><?xml version="1.0" encoding="utf-8"?>
+<p:sld xmlns:a="http://schemas.openxmlformats.org/drawingml/2006/main" xmlns:r="http://schemas.openxmlformats.org/officeDocument/2006/relationships" xmlns:p="http://schemas.openxmlformats.org/presentationml/2006/main">
+  <p:cSld>
+    <p:spTree>
+      <p:nvGrpSpPr>
+        <p:cNvPr id="1" name=""/>
+        <p:cNvGrpSpPr/>
+        <p:nvPr/>
+      </p:nvGrpSpPr>
+      <p:grpSpPr>
+        <a:xfrm>
+          <a:off x="0" y="0"/>
+          <a:ext cx="0" cy="0"/>
+          <a:chOff x="0" y="0"/>
+          <a:chExt cx="0" cy="0"/>
+        </a:xfrm>
+      </p:grpSpPr>
+      <p:sp>
+        <p:nvSpPr>
+          <p:cNvPr id="2" name="Title 1">
+            <a:extLst>
+              <a:ext uri="{FF2B5EF4-FFF2-40B4-BE49-F238E27FC236}">
+                <a16:creationId xmlns:a16="http://schemas.microsoft.com/office/drawing/2014/main" id="{D696FC7B-56EB-4CA0-8E7A-9F14D9A91209}"/>
+              </a:ext>
+            </a:extLst>
+          </p:cNvPr>
+          <p:cNvSpPr>
+            <a:spLocks noGrp="1"/>
+          </p:cNvSpPr>
+          <p:nvPr>
+            <p:ph type="title"/>
+          </p:nvPr>
+        </p:nvSpPr>
+        <p:spPr/>
+        <p:txBody>
+          <a:bodyPr/>
+          <a:lstStyle/>
+          <a:p>
+            <a:r>
+              <a:rPr lang="en-US" dirty="0"/>
+              <a:t>Child Component</a:t>
+            </a:r>
+          </a:p>
+        </p:txBody>
+      </p:sp>
+      <p:pic>
+        <p:nvPicPr>
+          <p:cNvPr id="7" name="Content Placeholder 6">
+            <a:extLst>
+              <a:ext uri="{FF2B5EF4-FFF2-40B4-BE49-F238E27FC236}">
+                <a16:creationId xmlns:a16="http://schemas.microsoft.com/office/drawing/2014/main" id="{A6969158-6B69-4F63-BF14-1911957A3D5C}"/>
+              </a:ext>
+            </a:extLst>
+          </p:cNvPr>
+          <p:cNvPicPr>
+            <a:picLocks noGrp="1" noChangeAspect="1"/>
+          </p:cNvPicPr>
+          <p:nvPr>
+            <p:ph idx="1"/>
+          </p:nvPr>
+        </p:nvPicPr>
+        <p:blipFill>
+          <a:blip r:embed="rId2"/>
+          <a:stretch>
+            <a:fillRect/>
+          </a:stretch>
+        </p:blipFill>
+        <p:spPr>
+          <a:xfrm>
+            <a:off x="737937" y="2234316"/>
+            <a:ext cx="4403558" cy="1998822"/>
+          </a:xfrm>
+        </p:spPr>
+      </p:pic>
+      <p:pic>
+        <p:nvPicPr>
+          <p:cNvPr id="9" name="Picture 8">
+            <a:extLst>
+              <a:ext uri="{FF2B5EF4-FFF2-40B4-BE49-F238E27FC236}">
+                <a16:creationId xmlns:a16="http://schemas.microsoft.com/office/drawing/2014/main" id="{DB44B6B7-46FF-4AAA-8220-4C90AD29C8E6}"/>
+              </a:ext>
+            </a:extLst>
+          </p:cNvPr>
+          <p:cNvPicPr>
+            <a:picLocks noChangeAspect="1"/>
+          </p:cNvPicPr>
+          <p:nvPr/>
+        </p:nvPicPr>
+        <p:blipFill>
+          <a:blip r:embed="rId3"/>
+          <a:stretch>
+            <a:fillRect/>
+          </a:stretch>
+        </p:blipFill>
+        <p:spPr>
+          <a:xfrm>
+            <a:off x="5550568" y="2234316"/>
+            <a:ext cx="6337884" cy="4258559"/>
+          </a:xfrm>
+          <a:prstGeom prst="rect">
+            <a:avLst/>
+          </a:prstGeom>
+        </p:spPr>
+      </p:pic>
+    </p:spTree>
+    <p:extLst>
+      <p:ext uri="{BB962C8B-B14F-4D97-AF65-F5344CB8AC3E}">
+        <p14:creationId xmlns:p14="http://schemas.microsoft.com/office/powerpoint/2010/main" val="2988541190"/>
+      </p:ext>
+    </p:extLst>
+  </p:cSld>
+  <p:clrMapOvr>
+    <a:masterClrMapping/>
+  </p:clrMapOvr>
+  <p:timing>
+    <p:tnLst>
+      <p:par>
+        <p:cTn id="1" dur="indefinite" restart="never" nodeType="tmRoot">
+          <p:childTnLst>
+            <p:seq concurrent="1" nextAc="seek">
+              <p:cTn id="2" dur="indefinite" nodeType="mainSeq">
+                <p:childTnLst>
+                  <p:par>
+                    <p:cTn id="3" fill="hold">
+                      <p:stCondLst>
+                        <p:cond delay="indefinite"/>
+                      </p:stCondLst>
+                      <p:childTnLst>
+                        <p:par>
+                          <p:cTn id="4" fill="hold">
+                            <p:stCondLst>
+                              <p:cond delay="0"/>
+                            </p:stCondLst>
+                            <p:childTnLst>
+                              <p:par>
+                                <p:cTn id="5" presetID="10" presetClass="entr" presetSubtype="0" fill="hold" nodeType="clickEffect">
+                                  <p:stCondLst>
+                                    <p:cond delay="0"/>
+                                  </p:stCondLst>
+                                  <p:childTnLst>
+                                    <p:set>
+                                      <p:cBhvr>
+                                        <p:cTn id="6" dur="1" fill="hold">
+                                          <p:stCondLst>
+                                            <p:cond delay="0"/>
+                                          </p:stCondLst>
+                                        </p:cTn>
+                                        <p:tgtEl>
+                                          <p:spTgt spid="7"/>
+                                        </p:tgtEl>
+                                        <p:attrNameLst>
+                                          <p:attrName>style.visibility</p:attrName>
+                                        </p:attrNameLst>
+                                      </p:cBhvr>
+                                      <p:to>
+                                        <p:strVal val="visible"/>
+                                      </p:to>
+                                    </p:set>
+                                    <p:animEffect transition="in" filter="fade">
+                                      <p:cBhvr>
+                                        <p:cTn id="7" dur="500"/>
+                                        <p:tgtEl>
+                                          <p:spTgt spid="7"/>
+                                        </p:tgtEl>
+                                      </p:cBhvr>
+                                    </p:animEffect>
+                                  </p:childTnLst>
+                                </p:cTn>
+                              </p:par>
+                            </p:childTnLst>
+                          </p:cTn>
+                        </p:par>
+                      </p:childTnLst>
+                    </p:cTn>
+                  </p:par>
+                  <p:par>
+                    <p:cTn id="8" fill="hold">
+                      <p:stCondLst>
+                        <p:cond delay="indefinite"/>
+                      </p:stCondLst>
+                      <p:childTnLst>
+                        <p:par>
+                          <p:cTn id="9" fill="hold">
+                            <p:stCondLst>
+                              <p:cond delay="0"/>
+                            </p:stCondLst>
+                            <p:childTnLst>
+                              <p:par>
+                                <p:cTn id="10" presetID="10" presetClass="entr" presetSubtype="0" fill="hold" nodeType="clickEffect">
+                                  <p:stCondLst>
+                                    <p:cond delay="0"/>
+                                  </p:stCondLst>
+                                  <p:childTnLst>
+                                    <p:set>
+                                      <p:cBhvr>
+                                        <p:cTn id="11" dur="1" fill="hold">
+                                          <p:stCondLst>
+                                            <p:cond delay="0"/>
+                                          </p:stCondLst>
+                                        </p:cTn>
+                                        <p:tgtEl>
+                                          <p:spTgt spid="9"/>
+                                        </p:tgtEl>
+                                        <p:attrNameLst>
+                                          <p:attrName>style.visibility</p:attrName>
+                                        </p:attrNameLst>
+                                      </p:cBhvr>
+                                      <p:to>
+                                        <p:strVal val="visible"/>
+                                      </p:to>
+                                    </p:set>
+                                    <p:animEffect transition="in" filter="fade">
+                                      <p:cBhvr>
+                                        <p:cTn id="12" dur="500"/>
+                                        <p:tgtEl>
+                                          <p:spTgt spid="9"/>
+                                        </p:tgtEl>
+                                      </p:cBhvr>
+                                    </p:animEffect>
+                                  </p:childTnLst>
+                                </p:cTn>
+                              </p:par>
+                            </p:childTnLst>
+                          </p:cTn>
+                        </p:par>
+                      </p:childTnLst>
+                    </p:cTn>
+                  </p:par>
+                </p:childTnLst>
+              </p:cTn>
+              <p:prevCondLst>
+                <p:cond evt="onPrev" delay="0">
+                  <p:tgtEl>
+                    <p:sldTgt/>
+                  </p:tgtEl>
+                </p:cond>
+              </p:prevCondLst>
+              <p:nextCondLst>
+                <p:cond evt="onNext" delay="0">
+                  <p:tgtEl>
+                    <p:sldTgt/>
+                  </p:tgtEl>
+                </p:cond>
+              </p:nextCondLst>
+            </p:seq>
+          </p:childTnLst>
+        </p:cTn>
+      </p:par>
+    </p:tnLst>
+  </p:timing>
 </p:sld>
 </file>
 

</xml_diff>